<commit_message>
Had to change comparison files for tests since fixtures XML changed:
-Had to change the base fixture XML for the auto slide number alignment 
feature.
</commit_message>
<xml_diff>
--- a/__tests__/fixtures/verifications/presentation-create-new-swap-slides-2-to-6.pptx
+++ b/__tests__/fixtures/verifications/presentation-create-new-swap-slides-2-to-6.pptx
@@ -750,7 +750,7 @@
       </p:grpSpPr>
       <p:sp>
         <p:nvSpPr>
-          <p:cNvPr id="4" name="Slide Number Placeholder 3"/>
+          <p:cNvPr id="4" name="Slide Number Placeholder 1"/>
           <p:cNvSpPr>
             <a:spLocks noGrp="1"/>
           </p:cNvSpPr>
@@ -758,10 +758,28 @@
             <p:ph type="sldNum" sz="quarter" idx="12"/>
           </p:nvPr>
         </p:nvSpPr>
-        <p:spPr/>
-        <p:txBody>
-          <a:bodyPr/>
-          <a:lstStyle/>
+        <p:spPr>
+          <a:xfrm>
+            <a:off x="6553200" y="6356350"/>
+            <a:ext cx="2133600" cy="365125"/>
+          </a:xfrm>
+          <a:prstGeom prst="rect">
+            <a:avLst/>
+          </a:prstGeom>
+        </p:spPr>
+        <p:txBody>
+          <a:bodyPr vert="horz" lIns="91440" tIns="45720" rIns="91440" bIns="45720" rtlCol="0" anchor="ctr"/>
+          <a:lstStyle>
+            <a:lvl1pPr algn="r">
+              <a:defRPr sz="1200">
+                <a:solidFill>
+                  <a:schemeClr val="tx1">
+                    <a:tint val="75000"/>
+                  </a:schemeClr>
+                </a:solidFill>
+              </a:defRPr>
+            </a:lvl1pPr>
+          </a:lstStyle>
           <a:p>
             <a:fld id="{EEA4CB10-01EC-4F0B-B0D3-B7B5571F5409}" type="slidenum">
               <a:rPr lang="en-US" smtClean="0"/>
@@ -1054,7 +1072,7 @@
       </p:grpSpPr>
       <p:sp>
         <p:nvSpPr>
-          <p:cNvPr id="4" name="Slide Number Placeholder 3"/>
+          <p:cNvPr id="4" name="Slide Number Placeholder 1"/>
           <p:cNvSpPr>
             <a:spLocks noGrp="1"/>
           </p:cNvSpPr>
@@ -1062,10 +1080,28 @@
             <p:ph type="sldNum" sz="quarter" idx="12"/>
           </p:nvPr>
         </p:nvSpPr>
-        <p:spPr/>
-        <p:txBody>
-          <a:bodyPr/>
-          <a:lstStyle/>
+        <p:spPr>
+          <a:xfrm>
+            <a:off x="6553200" y="6356350"/>
+            <a:ext cx="2133600" cy="365125"/>
+          </a:xfrm>
+          <a:prstGeom prst="rect">
+            <a:avLst/>
+          </a:prstGeom>
+        </p:spPr>
+        <p:txBody>
+          <a:bodyPr vert="horz" lIns="91440" tIns="45720" rIns="91440" bIns="45720" rtlCol="0" anchor="ctr"/>
+          <a:lstStyle>
+            <a:lvl1pPr algn="r">
+              <a:defRPr sz="1200">
+                <a:solidFill>
+                  <a:schemeClr val="tx1">
+                    <a:tint val="75000"/>
+                  </a:schemeClr>
+                </a:solidFill>
+              </a:defRPr>
+            </a:lvl1pPr>
+          </a:lstStyle>
           <a:p>
             <a:fld id="{EEA4CB10-01EC-4F0B-B0D3-B7B5571F5409}" type="slidenum">
               <a:rPr lang="en-US" smtClean="0"/>

</xml_diff>